<commit_message>
Optimized grafic and added needed png
</commit_message>
<xml_diff>
--- a/Phase 1/Flowchart Data Engineering.pptx
+++ b/Phase 1/Flowchart Data Engineering.pptx
@@ -197,7 +197,7 @@
           <a:p>
             <a:fld id="{4064435B-DF43-417F-96B3-8B6EC46F3A4C}" type="datetimeFigureOut">
               <a:rPr lang="de-DE" smtClean="0"/>
-              <a:t>22.07.2024</a:t>
+              <a:t>23.07.2024</a:t>
             </a:fld>
             <a:endParaRPr lang="de-DE"/>
           </a:p>
@@ -695,7 +695,7 @@
           <a:p>
             <a:fld id="{1EE83504-469B-4539-8A13-2A7D261DDDE8}" type="datetimeFigureOut">
               <a:rPr lang="de-DE" smtClean="0"/>
-              <a:t>22.07.2024</a:t>
+              <a:t>23.07.2024</a:t>
             </a:fld>
             <a:endParaRPr lang="de-DE"/>
           </a:p>
@@ -893,7 +893,7 @@
           <a:p>
             <a:fld id="{1EE83504-469B-4539-8A13-2A7D261DDDE8}" type="datetimeFigureOut">
               <a:rPr lang="de-DE" smtClean="0"/>
-              <a:t>22.07.2024</a:t>
+              <a:t>23.07.2024</a:t>
             </a:fld>
             <a:endParaRPr lang="de-DE"/>
           </a:p>
@@ -1101,7 +1101,7 @@
           <a:p>
             <a:fld id="{1EE83504-469B-4539-8A13-2A7D261DDDE8}" type="datetimeFigureOut">
               <a:rPr lang="de-DE" smtClean="0"/>
-              <a:t>22.07.2024</a:t>
+              <a:t>23.07.2024</a:t>
             </a:fld>
             <a:endParaRPr lang="de-DE"/>
           </a:p>
@@ -1299,7 +1299,7 @@
           <a:p>
             <a:fld id="{1EE83504-469B-4539-8A13-2A7D261DDDE8}" type="datetimeFigureOut">
               <a:rPr lang="de-DE" smtClean="0"/>
-              <a:t>22.07.2024</a:t>
+              <a:t>23.07.2024</a:t>
             </a:fld>
             <a:endParaRPr lang="de-DE"/>
           </a:p>
@@ -1574,7 +1574,7 @@
           <a:p>
             <a:fld id="{1EE83504-469B-4539-8A13-2A7D261DDDE8}" type="datetimeFigureOut">
               <a:rPr lang="de-DE" smtClean="0"/>
-              <a:t>22.07.2024</a:t>
+              <a:t>23.07.2024</a:t>
             </a:fld>
             <a:endParaRPr lang="de-DE"/>
           </a:p>
@@ -1839,7 +1839,7 @@
           <a:p>
             <a:fld id="{1EE83504-469B-4539-8A13-2A7D261DDDE8}" type="datetimeFigureOut">
               <a:rPr lang="de-DE" smtClean="0"/>
-              <a:t>22.07.2024</a:t>
+              <a:t>23.07.2024</a:t>
             </a:fld>
             <a:endParaRPr lang="de-DE"/>
           </a:p>
@@ -2251,7 +2251,7 @@
           <a:p>
             <a:fld id="{1EE83504-469B-4539-8A13-2A7D261DDDE8}" type="datetimeFigureOut">
               <a:rPr lang="de-DE" smtClean="0"/>
-              <a:t>22.07.2024</a:t>
+              <a:t>23.07.2024</a:t>
             </a:fld>
             <a:endParaRPr lang="de-DE"/>
           </a:p>
@@ -2392,7 +2392,7 @@
           <a:p>
             <a:fld id="{1EE83504-469B-4539-8A13-2A7D261DDDE8}" type="datetimeFigureOut">
               <a:rPr lang="de-DE" smtClean="0"/>
-              <a:t>22.07.2024</a:t>
+              <a:t>23.07.2024</a:t>
             </a:fld>
             <a:endParaRPr lang="de-DE"/>
           </a:p>
@@ -2505,7 +2505,7 @@
           <a:p>
             <a:fld id="{1EE83504-469B-4539-8A13-2A7D261DDDE8}" type="datetimeFigureOut">
               <a:rPr lang="de-DE" smtClean="0"/>
-              <a:t>22.07.2024</a:t>
+              <a:t>23.07.2024</a:t>
             </a:fld>
             <a:endParaRPr lang="de-DE"/>
           </a:p>
@@ -2816,7 +2816,7 @@
           <a:p>
             <a:fld id="{1EE83504-469B-4539-8A13-2A7D261DDDE8}" type="datetimeFigureOut">
               <a:rPr lang="de-DE" smtClean="0"/>
-              <a:t>22.07.2024</a:t>
+              <a:t>23.07.2024</a:t>
             </a:fld>
             <a:endParaRPr lang="de-DE"/>
           </a:p>
@@ -3104,7 +3104,7 @@
           <a:p>
             <a:fld id="{1EE83504-469B-4539-8A13-2A7D261DDDE8}" type="datetimeFigureOut">
               <a:rPr lang="de-DE" smtClean="0"/>
-              <a:t>22.07.2024</a:t>
+              <a:t>23.07.2024</a:t>
             </a:fld>
             <a:endParaRPr lang="de-DE"/>
           </a:p>
@@ -3345,7 +3345,7 @@
           <a:p>
             <a:fld id="{1EE83504-469B-4539-8A13-2A7D261DDDE8}" type="datetimeFigureOut">
               <a:rPr lang="de-DE" smtClean="0"/>
-              <a:t>22.07.2024</a:t>
+              <a:t>23.07.2024</a:t>
             </a:fld>
             <a:endParaRPr lang="de-DE"/>
           </a:p>
@@ -3790,16 +3790,16 @@
                   <a:lumOff val="95000"/>
                 </a:schemeClr>
               </a:gs>
-              <a:gs pos="74000">
+              <a:gs pos="15000">
                 <a:schemeClr val="accent4">
                   <a:lumMod val="45000"/>
                   <a:lumOff val="55000"/>
                 </a:schemeClr>
               </a:gs>
-              <a:gs pos="83000">
+              <a:gs pos="100000">
                 <a:schemeClr val="accent4">
-                  <a:lumMod val="45000"/>
-                  <a:lumOff val="55000"/>
+                  <a:lumMod val="60000"/>
+                  <a:lumOff val="40000"/>
                 </a:schemeClr>
               </a:gs>
             </a:gsLst>
@@ -3907,16 +3907,16 @@
                   <a:lumOff val="95000"/>
                 </a:schemeClr>
               </a:gs>
-              <a:gs pos="74000">
+              <a:gs pos="15000">
                 <a:schemeClr val="accent4">
                   <a:lumMod val="45000"/>
                   <a:lumOff val="55000"/>
                 </a:schemeClr>
               </a:gs>
-              <a:gs pos="83000">
+              <a:gs pos="100000">
                 <a:schemeClr val="accent4">
-                  <a:lumMod val="45000"/>
-                  <a:lumOff val="55000"/>
+                  <a:lumMod val="60000"/>
+                  <a:lumOff val="40000"/>
                 </a:schemeClr>
               </a:gs>
             </a:gsLst>
@@ -4569,16 +4569,16 @@
                   <a:lumOff val="95000"/>
                 </a:schemeClr>
               </a:gs>
-              <a:gs pos="74000">
+              <a:gs pos="15000">
                 <a:schemeClr val="accent4">
                   <a:lumMod val="45000"/>
                   <a:lumOff val="55000"/>
                 </a:schemeClr>
               </a:gs>
-              <a:gs pos="83000">
+              <a:gs pos="100000">
                 <a:schemeClr val="accent4">
-                  <a:lumMod val="45000"/>
-                  <a:lumOff val="55000"/>
+                  <a:lumMod val="60000"/>
+                  <a:lumOff val="40000"/>
                 </a:schemeClr>
               </a:gs>
             </a:gsLst>

</xml_diff>